<commit_message>
Version Final del proyecto
</commit_message>
<xml_diff>
--- a/Presentacion final.pptx
+++ b/Presentacion final.pptx
@@ -113,6 +113,11 @@
       </a:defRPr>
     </a:lvl9pPr>
   </p:defaultTextStyle>
+  <p:extLst>
+    <p:ext uri="{EFAFB233-063F-42B5-8137-9DF3F51BA10A}">
+      <p15:sldGuideLst xmlns:p15="http://schemas.microsoft.com/office/powerpoint/2012/main"/>
+    </p:ext>
+  </p:extLst>
 </p:presentation>
 </file>
 
@@ -5967,36 +5972,38 @@
           </a:p>
         </p:txBody>
       </p:sp>
-      <p:sp>
-        <p:nvSpPr>
-          <p:cNvPr id="3" name="Content Placeholder 2">
+      <p:pic>
+        <p:nvPicPr>
+          <p:cNvPr id="4" name="Content Placeholder 3">
             <a:extLst>
               <a:ext uri="{FF2B5EF4-FFF2-40B4-BE49-F238E27FC236}">
-                <a16:creationId xmlns:a16="http://schemas.microsoft.com/office/drawing/2014/main" id="{26C2B458-6BA3-4BC3-8F89-3B8DCD96D997}"/>
+                <a16:creationId xmlns:a16="http://schemas.microsoft.com/office/drawing/2014/main" id="{DE2B34D3-62AE-4004-872D-C43890204AFF}"/>
               </a:ext>
             </a:extLst>
           </p:cNvPr>
-          <p:cNvSpPr>
-            <a:spLocks noGrp="1"/>
-          </p:cNvSpPr>
+          <p:cNvPicPr>
+            <a:picLocks noGrp="1" noChangeAspect="1"/>
+          </p:cNvPicPr>
           <p:nvPr>
             <p:ph idx="1"/>
           </p:nvPr>
-        </p:nvSpPr>
+        </p:nvPicPr>
+        <p:blipFill>
+          <a:blip r:embed="rId2"/>
+          <a:stretch>
+            <a:fillRect/>
+          </a:stretch>
+        </p:blipFill>
         <p:spPr>
           <a:xfrm>
-            <a:off x="677334" y="2009775"/>
-            <a:ext cx="8596668" cy="4031587"/>
+            <a:off x="2596576" y="1653282"/>
+            <a:ext cx="5328224" cy="4812303"/>
           </a:xfrm>
+          <a:prstGeom prst="rect">
+            <a:avLst/>
+          </a:prstGeom>
         </p:spPr>
-        <p:txBody>
-          <a:bodyPr/>
-          <a:lstStyle/>
-          <a:p>
-            <a:endParaRPr lang="es-MX" dirty="0"/>
-          </a:p>
-        </p:txBody>
-      </p:sp>
+      </p:pic>
     </p:spTree>
     <p:extLst>
       <p:ext uri="{BB962C8B-B14F-4D97-AF65-F5344CB8AC3E}">

</xml_diff>